<commit_message>
updates to nn presentation
</commit_message>
<xml_diff>
--- a/Presentations/ML Neural Networks.pptx
+++ b/Presentations/ML Neural Networks.pptx
@@ -5,7 +5,7 @@
     <p:sldMasterId id="2147483648" r:id="rId1"/>
   </p:sldMasterIdLst>
   <p:notesMasterIdLst>
-    <p:notesMasterId r:id="rId17"/>
+    <p:notesMasterId r:id="rId18"/>
   </p:notesMasterIdLst>
   <p:sldIdLst>
     <p:sldId id="256" r:id="rId2"/>
@@ -23,6 +23,7 @@
     <p:sldId id="295" r:id="rId14"/>
     <p:sldId id="296" r:id="rId15"/>
     <p:sldId id="297" r:id="rId16"/>
+    <p:sldId id="298" r:id="rId17"/>
   </p:sldIdLst>
   <p:sldSz cx="9144000" cy="6858000" type="screen4x3"/>
   <p:notesSz cx="6858000" cy="9144000"/>
@@ -206,7 +207,7 @@
           <a:p>
             <a:fld id="{FAF957FC-5175-49AC-8D2B-2F056FFFC1DD}" type="datetimeFigureOut">
               <a:rPr lang="en-US" smtClean="0"/>
-              <a:t>8/17/2017</a:t>
+              <a:t>8/19/2017</a:t>
             </a:fld>
             <a:endParaRPr lang="en-US"/>
           </a:p>
@@ -656,7 +657,7 @@
             <a:fld id="{1D8BD707-D9CF-40AE-B4C6-C98DA3205C09}" type="datetimeFigureOut">
               <a:rPr lang="en-US" smtClean="0"/>
               <a:pPr/>
-              <a:t>8/17/2017</a:t>
+              <a:t>8/19/2017</a:t>
             </a:fld>
             <a:endParaRPr lang="en-US"/>
           </a:p>
@@ -823,7 +824,7 @@
             <a:fld id="{1D8BD707-D9CF-40AE-B4C6-C98DA3205C09}" type="datetimeFigureOut">
               <a:rPr lang="en-US" smtClean="0"/>
               <a:pPr/>
-              <a:t>8/17/2017</a:t>
+              <a:t>8/19/2017</a:t>
             </a:fld>
             <a:endParaRPr lang="en-US"/>
           </a:p>
@@ -1000,7 +1001,7 @@
             <a:fld id="{1D8BD707-D9CF-40AE-B4C6-C98DA3205C09}" type="datetimeFigureOut">
               <a:rPr lang="en-US" smtClean="0"/>
               <a:pPr/>
-              <a:t>8/17/2017</a:t>
+              <a:t>8/19/2017</a:t>
             </a:fld>
             <a:endParaRPr lang="en-US"/>
           </a:p>
@@ -1167,7 +1168,7 @@
             <a:fld id="{1D8BD707-D9CF-40AE-B4C6-C98DA3205C09}" type="datetimeFigureOut">
               <a:rPr lang="en-US" smtClean="0"/>
               <a:pPr/>
-              <a:t>8/17/2017</a:t>
+              <a:t>8/19/2017</a:t>
             </a:fld>
             <a:endParaRPr lang="en-US"/>
           </a:p>
@@ -1410,7 +1411,7 @@
             <a:fld id="{1D8BD707-D9CF-40AE-B4C6-C98DA3205C09}" type="datetimeFigureOut">
               <a:rPr lang="en-US" smtClean="0"/>
               <a:pPr/>
-              <a:t>8/17/2017</a:t>
+              <a:t>8/19/2017</a:t>
             </a:fld>
             <a:endParaRPr lang="en-US"/>
           </a:p>
@@ -1695,7 +1696,7 @@
             <a:fld id="{1D8BD707-D9CF-40AE-B4C6-C98DA3205C09}" type="datetimeFigureOut">
               <a:rPr lang="en-US" smtClean="0"/>
               <a:pPr/>
-              <a:t>8/17/2017</a:t>
+              <a:t>8/19/2017</a:t>
             </a:fld>
             <a:endParaRPr lang="en-US"/>
           </a:p>
@@ -2114,7 +2115,7 @@
             <a:fld id="{1D8BD707-D9CF-40AE-B4C6-C98DA3205C09}" type="datetimeFigureOut">
               <a:rPr lang="en-US" smtClean="0"/>
               <a:pPr/>
-              <a:t>8/17/2017</a:t>
+              <a:t>8/19/2017</a:t>
             </a:fld>
             <a:endParaRPr lang="en-US"/>
           </a:p>
@@ -2229,7 +2230,7 @@
             <a:fld id="{1D8BD707-D9CF-40AE-B4C6-C98DA3205C09}" type="datetimeFigureOut">
               <a:rPr lang="en-US" smtClean="0"/>
               <a:pPr/>
-              <a:t>8/17/2017</a:t>
+              <a:t>8/19/2017</a:t>
             </a:fld>
             <a:endParaRPr lang="en-US"/>
           </a:p>
@@ -2321,7 +2322,7 @@
             <a:fld id="{1D8BD707-D9CF-40AE-B4C6-C98DA3205C09}" type="datetimeFigureOut">
               <a:rPr lang="en-US" smtClean="0"/>
               <a:pPr/>
-              <a:t>8/17/2017</a:t>
+              <a:t>8/19/2017</a:t>
             </a:fld>
             <a:endParaRPr lang="en-US"/>
           </a:p>
@@ -2595,7 +2596,7 @@
             <a:fld id="{1D8BD707-D9CF-40AE-B4C6-C98DA3205C09}" type="datetimeFigureOut">
               <a:rPr lang="en-US" smtClean="0"/>
               <a:pPr/>
-              <a:t>8/17/2017</a:t>
+              <a:t>8/19/2017</a:t>
             </a:fld>
             <a:endParaRPr lang="en-US"/>
           </a:p>
@@ -2845,7 +2846,7 @@
             <a:fld id="{1D8BD707-D9CF-40AE-B4C6-C98DA3205C09}" type="datetimeFigureOut">
               <a:rPr lang="en-US" smtClean="0"/>
               <a:pPr/>
-              <a:t>8/17/2017</a:t>
+              <a:t>8/19/2017</a:t>
             </a:fld>
             <a:endParaRPr lang="en-US"/>
           </a:p>
@@ -3055,7 +3056,7 @@
             <a:fld id="{1D8BD707-D9CF-40AE-B4C6-C98DA3205C09}" type="datetimeFigureOut">
               <a:rPr lang="en-US" smtClean="0"/>
               <a:pPr/>
-              <a:t>8/17/2017</a:t>
+              <a:t>8/19/2017</a:t>
             </a:fld>
             <a:endParaRPr lang="en-US"/>
           </a:p>
@@ -8947,8 +8948,8 @@
           </a:fontRef>
         </p:style>
       </p:cxnSp>
-      <mc:AlternateContent xmlns:mc="http://schemas.openxmlformats.org/markup-compatibility/2006">
-        <mc:Choice xmlns:a14="http://schemas.microsoft.com/office/drawing/2010/main" Requires="a14">
+      <mc:AlternateContent xmlns:mc="http://schemas.openxmlformats.org/markup-compatibility/2006" xmlns:a14="http://schemas.microsoft.com/office/drawing/2010/main">
+        <mc:Choice Requires="a14">
           <p:sp>
             <p:nvSpPr>
               <p:cNvPr id="15" name="TextBox 14"/>
@@ -9045,7 +9046,7 @@
             </p:txBody>
           </p:sp>
         </mc:Choice>
-        <mc:Fallback>
+        <mc:Fallback xmlns="">
           <p:sp>
             <p:nvSpPr>
               <p:cNvPr id="15" name="TextBox 14"/>
@@ -10962,8 +10963,8 @@
           </a:p>
         </p:txBody>
       </p:sp>
-      <mc:AlternateContent xmlns:mc="http://schemas.openxmlformats.org/markup-compatibility/2006">
-        <mc:Choice xmlns:a14="http://schemas.microsoft.com/office/drawing/2010/main" Requires="a14">
+      <mc:AlternateContent xmlns:mc="http://schemas.openxmlformats.org/markup-compatibility/2006" xmlns:a14="http://schemas.microsoft.com/office/drawing/2010/main">
+        <mc:Choice Requires="a14">
           <p:sp>
             <p:nvSpPr>
               <p:cNvPr id="107" name="TextBox 106"/>
@@ -11060,7 +11061,7 @@
             </p:txBody>
           </p:sp>
         </mc:Choice>
-        <mc:Fallback>
+        <mc:Fallback xmlns="">
           <p:sp>
             <p:nvSpPr>
               <p:cNvPr id="107" name="TextBox 106"/>
@@ -13667,8 +13668,8 @@
           </a:p>
         </p:txBody>
       </p:sp>
-      <mc:AlternateContent xmlns:mc="http://schemas.openxmlformats.org/markup-compatibility/2006">
-        <mc:Choice xmlns:a14="http://schemas.microsoft.com/office/drawing/2010/main" Requires="a14">
+      <mc:AlternateContent xmlns:mc="http://schemas.openxmlformats.org/markup-compatibility/2006" xmlns:a14="http://schemas.microsoft.com/office/drawing/2010/main">
+        <mc:Choice Requires="a14">
           <p:sp>
             <p:nvSpPr>
               <p:cNvPr id="107" name="TextBox 106"/>
@@ -13765,7 +13766,7 @@
             </p:txBody>
           </p:sp>
         </mc:Choice>
-        <mc:Fallback>
+        <mc:Fallback xmlns="">
           <p:sp>
             <p:nvSpPr>
               <p:cNvPr id="107" name="TextBox 106"/>
@@ -14499,8 +14500,8 @@
           </a:fontRef>
         </p:style>
       </p:cxnSp>
-      <mc:AlternateContent xmlns:mc="http://schemas.openxmlformats.org/markup-compatibility/2006">
-        <mc:Choice xmlns:a14="http://schemas.microsoft.com/office/drawing/2010/main" Requires="a14">
+      <mc:AlternateContent xmlns:mc="http://schemas.openxmlformats.org/markup-compatibility/2006" xmlns:a14="http://schemas.microsoft.com/office/drawing/2010/main">
+        <mc:Choice Requires="a14">
           <p:sp>
             <p:nvSpPr>
               <p:cNvPr id="71" name="TextBox 70"/>
@@ -14601,7 +14602,7 @@
             </p:txBody>
           </p:sp>
         </mc:Choice>
-        <mc:Fallback>
+        <mc:Fallback xmlns="">
           <p:sp>
             <p:nvSpPr>
               <p:cNvPr id="71" name="TextBox 70"/>
@@ -18384,15 +18385,7 @@
                   <a:srgbClr val="FF0000"/>
                 </a:solidFill>
               </a:rPr>
-              <a:t>Each output node </a:t>
-            </a:r>
-            <a:r>
-              <a:rPr lang="en-US" sz="1400" dirty="0" smtClean="0">
-                <a:solidFill>
-                  <a:srgbClr val="FF0000"/>
-                </a:solidFill>
-              </a:rPr>
-              <a:t>specializes </a:t>
+              <a:t>Each output node specializes </a:t>
             </a:r>
             <a:br>
               <a:rPr lang="en-US" sz="1400" dirty="0" smtClean="0">
@@ -18459,6 +18452,256 @@
     <p:extLst>
       <p:ext uri="{BB962C8B-B14F-4D97-AF65-F5344CB8AC3E}">
         <p14:creationId xmlns:p14="http://schemas.microsoft.com/office/powerpoint/2010/main" val="528999694"/>
+      </p:ext>
+    </p:extLst>
+  </p:cSld>
+  <p:clrMapOvr>
+    <a:masterClrMapping/>
+  </p:clrMapOvr>
+  <p:timing>
+    <p:tnLst>
+      <p:par>
+        <p:cTn id="1" dur="indefinite" restart="never" nodeType="tmRoot"/>
+      </p:par>
+    </p:tnLst>
+  </p:timing>
+</p:sld>
+</file>
+
+<file path=ppt/slides/slide16.xml><?xml version="1.0" encoding="utf-8"?>
+<p:sld xmlns:a="http://schemas.openxmlformats.org/drawingml/2006/main" xmlns:r="http://schemas.openxmlformats.org/officeDocument/2006/relationships" xmlns:p="http://schemas.openxmlformats.org/presentationml/2006/main">
+  <p:cSld>
+    <p:spTree>
+      <p:nvGrpSpPr>
+        <p:cNvPr id="1" name=""/>
+        <p:cNvGrpSpPr/>
+        <p:nvPr/>
+      </p:nvGrpSpPr>
+      <p:grpSpPr>
+        <a:xfrm>
+          <a:off x="0" y="0"/>
+          <a:ext cx="0" cy="0"/>
+          <a:chOff x="0" y="0"/>
+          <a:chExt cx="0" cy="0"/>
+        </a:xfrm>
+      </p:grpSpPr>
+      <p:sp>
+        <p:nvSpPr>
+          <p:cNvPr id="2" name="Title 1"/>
+          <p:cNvSpPr>
+            <a:spLocks noGrp="1"/>
+          </p:cNvSpPr>
+          <p:nvPr>
+            <p:ph type="title"/>
+          </p:nvPr>
+        </p:nvSpPr>
+        <p:spPr>
+          <a:xfrm>
+            <a:off x="457200" y="274638"/>
+            <a:ext cx="8610600" cy="792162"/>
+          </a:xfrm>
+        </p:spPr>
+        <p:txBody>
+          <a:bodyPr>
+            <a:normAutofit/>
+          </a:bodyPr>
+          <a:lstStyle/>
+          <a:p>
+            <a:pPr algn="l"/>
+            <a:r>
+              <a:rPr lang="en-US" dirty="0" smtClean="0">
+                <a:solidFill>
+                  <a:schemeClr val="accent1">
+                    <a:lumMod val="75000"/>
+                  </a:schemeClr>
+                </a:solidFill>
+              </a:rPr>
+              <a:t>Final Note – Traini</a:t>
+            </a:r>
+            <a:r>
+              <a:rPr lang="en-US" dirty="0" smtClean="0">
+                <a:solidFill>
+                  <a:schemeClr val="accent1">
+                    <a:lumMod val="75000"/>
+                  </a:schemeClr>
+                </a:solidFill>
+              </a:rPr>
+              <a:t>ng vs. </a:t>
+            </a:r>
+            <a:r>
+              <a:rPr lang="en-US" smtClean="0">
+                <a:solidFill>
+                  <a:schemeClr val="accent1">
+                    <a:lumMod val="75000"/>
+                  </a:schemeClr>
+                </a:solidFill>
+              </a:rPr>
+              <a:t>Prediction</a:t>
+            </a:r>
+            <a:endParaRPr lang="en-US" dirty="0">
+              <a:solidFill>
+                <a:schemeClr val="accent1">
+                  <a:lumMod val="75000"/>
+                </a:schemeClr>
+              </a:solidFill>
+            </a:endParaRPr>
+          </a:p>
+        </p:txBody>
+      </p:sp>
+      <p:cxnSp>
+        <p:nvCxnSpPr>
+          <p:cNvPr id="5" name="Straight Connector 4"/>
+          <p:cNvCxnSpPr/>
+          <p:nvPr/>
+        </p:nvCxnSpPr>
+        <p:spPr>
+          <a:xfrm>
+            <a:off x="0" y="990600"/>
+            <a:ext cx="9144000" cy="0"/>
+          </a:xfrm>
+          <a:prstGeom prst="line">
+            <a:avLst/>
+          </a:prstGeom>
+          <a:ln w="19050"/>
+        </p:spPr>
+        <p:style>
+          <a:lnRef idx="1">
+            <a:schemeClr val="accent1"/>
+          </a:lnRef>
+          <a:fillRef idx="0">
+            <a:schemeClr val="accent1"/>
+          </a:fillRef>
+          <a:effectRef idx="0">
+            <a:schemeClr val="accent1"/>
+          </a:effectRef>
+          <a:fontRef idx="minor">
+            <a:schemeClr val="tx1"/>
+          </a:fontRef>
+        </p:style>
+      </p:cxnSp>
+      <p:sp>
+        <p:nvSpPr>
+          <p:cNvPr id="36" name="TextBox 35"/>
+          <p:cNvSpPr txBox="1"/>
+          <p:nvPr/>
+        </p:nvSpPr>
+        <p:spPr>
+          <a:xfrm>
+            <a:off x="152400" y="1371600"/>
+            <a:ext cx="8408712" cy="1815882"/>
+          </a:xfrm>
+          <a:prstGeom prst="rect">
+            <a:avLst/>
+          </a:prstGeom>
+          <a:noFill/>
+        </p:spPr>
+        <p:txBody>
+          <a:bodyPr wrap="none" rtlCol="0">
+            <a:spAutoFit/>
+          </a:bodyPr>
+          <a:lstStyle/>
+          <a:p>
+            <a:pPr marL="285750" indent="-285750">
+              <a:buFont typeface="Arial" panose="020B0604020202020204" pitchFamily="34" charset="0"/>
+              <a:buChar char="•"/>
+            </a:pPr>
+            <a:r>
+              <a:rPr lang="en-US" sz="2400" b="1" dirty="0" smtClean="0">
+                <a:solidFill>
+                  <a:schemeClr val="accent5">
+                    <a:lumMod val="75000"/>
+                  </a:schemeClr>
+                </a:solidFill>
+              </a:rPr>
+              <a:t>Once we have trained the neural network, we do not have to</a:t>
+            </a:r>
+          </a:p>
+          <a:p>
+            <a:r>
+              <a:rPr lang="en-US" sz="2400" b="1" dirty="0">
+                <a:solidFill>
+                  <a:schemeClr val="accent5">
+                    <a:lumMod val="75000"/>
+                  </a:schemeClr>
+                </a:solidFill>
+              </a:rPr>
+              <a:t> </a:t>
+            </a:r>
+            <a:r>
+              <a:rPr lang="en-US" sz="2400" b="1" dirty="0" smtClean="0">
+                <a:solidFill>
+                  <a:schemeClr val="accent5">
+                    <a:lumMod val="75000"/>
+                  </a:schemeClr>
+                </a:solidFill>
+              </a:rPr>
+              <a:t>   repeat the training steps when using the model for prediction.</a:t>
+            </a:r>
+          </a:p>
+          <a:p>
+            <a:endParaRPr lang="en-US" sz="2400" b="1" dirty="0" smtClean="0">
+              <a:solidFill>
+                <a:schemeClr val="accent5">
+                  <a:lumMod val="75000"/>
+                </a:schemeClr>
+              </a:solidFill>
+            </a:endParaRPr>
+          </a:p>
+          <a:p>
+            <a:pPr marL="800100" lvl="1" indent="-342900">
+              <a:buFont typeface="Arial" panose="020B0604020202020204" pitchFamily="34" charset="0"/>
+              <a:buChar char="•"/>
+            </a:pPr>
+            <a:r>
+              <a:rPr lang="en-US" sz="2000" b="1" dirty="0" smtClean="0">
+                <a:solidFill>
+                  <a:schemeClr val="accent6">
+                    <a:lumMod val="75000"/>
+                  </a:schemeClr>
+                </a:solidFill>
+              </a:rPr>
+              <a:t>No repeating of Epochs, Gradient Descent and Backward Propagation.</a:t>
+            </a:r>
+          </a:p>
+          <a:p>
+            <a:pPr marL="800100" lvl="1" indent="-342900">
+              <a:buFont typeface="Arial" panose="020B0604020202020204" pitchFamily="34" charset="0"/>
+              <a:buChar char="•"/>
+            </a:pPr>
+            <a:r>
+              <a:rPr lang="en-US" sz="2000" b="1" dirty="0" smtClean="0">
+                <a:solidFill>
+                  <a:schemeClr val="accent6">
+                    <a:lumMod val="75000"/>
+                  </a:schemeClr>
+                </a:solidFill>
+              </a:rPr>
+              <a:t>The model will run much faster than during training.</a:t>
+            </a:r>
+            <a:r>
+              <a:rPr lang="en-US" sz="2000" b="1" dirty="0" smtClean="0">
+                <a:solidFill>
+                  <a:schemeClr val="accent6">
+                    <a:lumMod val="75000"/>
+                  </a:schemeClr>
+                </a:solidFill>
+              </a:rPr>
+              <a:t> </a:t>
+            </a:r>
+            <a:endParaRPr lang="en-US" sz="2000" b="1" dirty="0" smtClean="0">
+              <a:solidFill>
+                <a:schemeClr val="accent6">
+                  <a:lumMod val="75000"/>
+                </a:schemeClr>
+              </a:solidFill>
+            </a:endParaRPr>
+          </a:p>
+        </p:txBody>
+      </p:sp>
+    </p:spTree>
+    <p:extLst>
+      <p:ext uri="{BB962C8B-B14F-4D97-AF65-F5344CB8AC3E}">
+        <p14:creationId xmlns:p14="http://schemas.microsoft.com/office/powerpoint/2010/main" val="1187385794"/>
       </p:ext>
     </p:extLst>
   </p:cSld>
@@ -18815,17 +19058,7 @@
                   </a:schemeClr>
                 </a:solidFill>
               </a:rPr>
-              <a:t>    t</a:t>
-            </a:r>
-            <a:r>
-              <a:rPr lang="en-US" sz="2400" dirty="0" smtClean="0">
-                <a:solidFill>
-                  <a:schemeClr val="accent5">
-                    <a:lumMod val="75000"/>
-                  </a:schemeClr>
-                </a:solidFill>
-              </a:rPr>
-              <a:t>he concept of neurons.</a:t>
+              <a:t>    the concept of neurons.</a:t>
             </a:r>
           </a:p>
           <a:p>
@@ -19016,17 +19249,7 @@
                   </a:schemeClr>
                 </a:solidFill>
               </a:rPr>
-              <a:t>t</a:t>
-            </a:r>
-            <a:r>
-              <a:rPr lang="en-US" sz="2400" dirty="0" smtClean="0">
-                <a:solidFill>
-                  <a:schemeClr val="accent5">
-                    <a:lumMod val="75000"/>
-                  </a:schemeClr>
-                </a:solidFill>
-              </a:rPr>
-              <a:t>he first real neural network – MADALINE.</a:t>
+              <a:t>the first real neural network – MADALINE.</a:t>
             </a:r>
           </a:p>
           <a:p>
@@ -19174,17 +19397,7 @@
                   </a:schemeClr>
                 </a:solidFill>
               </a:rPr>
-              <a:t>r</a:t>
-            </a:r>
-            <a:r>
-              <a:rPr lang="en-US" sz="2400" dirty="0" smtClean="0">
-                <a:solidFill>
-                  <a:schemeClr val="accent5">
-                    <a:lumMod val="75000"/>
-                  </a:schemeClr>
-                </a:solidFill>
-              </a:rPr>
-              <a:t>esearch continued until </a:t>
+              <a:t>research continued until </a:t>
             </a:r>
             <a:r>
               <a:rPr lang="en-US" sz="2400" b="1" dirty="0" smtClean="0">
@@ -19236,13 +19449,6 @@
               </a:rPr>
               <a:t>i.e., demonstrated the Perceptron could not model an XOR operation.</a:t>
             </a:r>
-            <a:endParaRPr lang="en-US" sz="2000" b="1" dirty="0" smtClean="0">
-              <a:solidFill>
-                <a:schemeClr val="accent5">
-                  <a:lumMod val="75000"/>
-                </a:schemeClr>
-              </a:solidFill>
-            </a:endParaRPr>
           </a:p>
         </p:txBody>
       </p:sp>
@@ -21667,6 +21873,252 @@
           </a:p>
         </p:txBody>
       </p:sp>
+      <p:cxnSp>
+        <p:nvCxnSpPr>
+          <p:cNvPr id="25" name="Straight Arrow Connector 24"/>
+          <p:cNvCxnSpPr/>
+          <p:nvPr/>
+        </p:nvCxnSpPr>
+        <p:spPr>
+          <a:xfrm flipV="1">
+            <a:off x="4198664" y="4609412"/>
+            <a:ext cx="217945" cy="791580"/>
+          </a:xfrm>
+          <a:prstGeom prst="straightConnector1">
+            <a:avLst/>
+          </a:prstGeom>
+          <a:ln>
+            <a:solidFill>
+              <a:srgbClr val="FF0000"/>
+            </a:solidFill>
+            <a:tailEnd type="arrow"/>
+          </a:ln>
+        </p:spPr>
+        <p:style>
+          <a:lnRef idx="1">
+            <a:schemeClr val="accent1"/>
+          </a:lnRef>
+          <a:fillRef idx="0">
+            <a:schemeClr val="accent1"/>
+          </a:fillRef>
+          <a:effectRef idx="0">
+            <a:schemeClr val="accent1"/>
+          </a:effectRef>
+          <a:fontRef idx="minor">
+            <a:schemeClr val="tx1"/>
+          </a:fontRef>
+        </p:style>
+      </p:cxnSp>
+      <p:sp>
+        <p:nvSpPr>
+          <p:cNvPr id="26" name="TextBox 25"/>
+          <p:cNvSpPr txBox="1"/>
+          <p:nvPr/>
+        </p:nvSpPr>
+        <p:spPr>
+          <a:xfrm>
+            <a:off x="3657599" y="5400991"/>
+            <a:ext cx="1475789" cy="461665"/>
+          </a:xfrm>
+          <a:prstGeom prst="rect">
+            <a:avLst/>
+          </a:prstGeom>
+          <a:noFill/>
+        </p:spPr>
+        <p:txBody>
+          <a:bodyPr wrap="none" rtlCol="0">
+            <a:spAutoFit/>
+          </a:bodyPr>
+          <a:lstStyle/>
+          <a:p>
+            <a:r>
+              <a:rPr lang="en-US" sz="1200" dirty="0" smtClean="0">
+                <a:solidFill>
+                  <a:srgbClr val="FF0000"/>
+                </a:solidFill>
+              </a:rPr>
+              <a:t>Neuron outputs only</a:t>
+            </a:r>
+          </a:p>
+          <a:p>
+            <a:r>
+              <a:rPr lang="en-US" sz="1200" dirty="0" smtClean="0">
+                <a:solidFill>
+                  <a:srgbClr val="FF0000"/>
+                </a:solidFill>
+              </a:rPr>
+              <a:t>a single value.</a:t>
+            </a:r>
+            <a:endParaRPr lang="en-US" sz="1200" dirty="0" smtClean="0">
+              <a:solidFill>
+                <a:srgbClr val="FF0000"/>
+              </a:solidFill>
+            </a:endParaRPr>
+          </a:p>
+        </p:txBody>
+      </p:sp>
+      <p:sp>
+        <p:nvSpPr>
+          <p:cNvPr id="31" name="TextBox 30"/>
+          <p:cNvSpPr txBox="1"/>
+          <p:nvPr/>
+        </p:nvSpPr>
+        <p:spPr>
+          <a:xfrm>
+            <a:off x="7288163" y="5715000"/>
+            <a:ext cx="1883529" cy="1015663"/>
+          </a:xfrm>
+          <a:prstGeom prst="rect">
+            <a:avLst/>
+          </a:prstGeom>
+          <a:noFill/>
+        </p:spPr>
+        <p:txBody>
+          <a:bodyPr wrap="none" rtlCol="0">
+            <a:spAutoFit/>
+          </a:bodyPr>
+          <a:lstStyle/>
+          <a:p>
+            <a:r>
+              <a:rPr lang="en-US" sz="1200" dirty="0" smtClean="0">
+                <a:solidFill>
+                  <a:srgbClr val="FF0000"/>
+                </a:solidFill>
+              </a:rPr>
+              <a:t>Output nodes Y</a:t>
+            </a:r>
+            <a:r>
+              <a:rPr lang="en-US" sz="1200" baseline="-25000" dirty="0" smtClean="0">
+                <a:solidFill>
+                  <a:srgbClr val="FF0000"/>
+                </a:solidFill>
+              </a:rPr>
+              <a:t>1</a:t>
+            </a:r>
+            <a:r>
+              <a:rPr lang="en-US" sz="1200" dirty="0" smtClean="0">
+                <a:solidFill>
+                  <a:srgbClr val="FF0000"/>
+                </a:solidFill>
+              </a:rPr>
+              <a:t>, Y</a:t>
+            </a:r>
+            <a:r>
+              <a:rPr lang="en-US" sz="1200" baseline="-25000" dirty="0" smtClean="0">
+                <a:solidFill>
+                  <a:srgbClr val="FF0000"/>
+                </a:solidFill>
+              </a:rPr>
+              <a:t>2</a:t>
+            </a:r>
+            <a:r>
+              <a:rPr lang="en-US" sz="1200" dirty="0" smtClean="0">
+                <a:solidFill>
+                  <a:srgbClr val="FF0000"/>
+                </a:solidFill>
+              </a:rPr>
+              <a:t>  and</a:t>
+            </a:r>
+          </a:p>
+          <a:p>
+            <a:r>
+              <a:rPr lang="en-US" sz="1200" dirty="0" smtClean="0">
+                <a:solidFill>
+                  <a:srgbClr val="FF0000"/>
+                </a:solidFill>
+              </a:rPr>
+              <a:t>Y</a:t>
+            </a:r>
+            <a:r>
+              <a:rPr lang="en-US" sz="1200" baseline="-25000" dirty="0" smtClean="0">
+                <a:solidFill>
+                  <a:srgbClr val="FF0000"/>
+                </a:solidFill>
+              </a:rPr>
+              <a:t>3</a:t>
+            </a:r>
+            <a:r>
+              <a:rPr lang="en-US" sz="1200" dirty="0" smtClean="0">
+                <a:solidFill>
+                  <a:srgbClr val="FF0000"/>
+                </a:solidFill>
+              </a:rPr>
+              <a:t> each weight the output</a:t>
+            </a:r>
+          </a:p>
+          <a:p>
+            <a:r>
+              <a:rPr lang="en-US" sz="1200" dirty="0" smtClean="0">
+                <a:solidFill>
+                  <a:srgbClr val="FF0000"/>
+                </a:solidFill>
+              </a:rPr>
+              <a:t>from the neuron and make</a:t>
+            </a:r>
+          </a:p>
+          <a:p>
+            <a:r>
+              <a:rPr lang="en-US" sz="1200" dirty="0" smtClean="0">
+                <a:solidFill>
+                  <a:srgbClr val="FF0000"/>
+                </a:solidFill>
+              </a:rPr>
+              <a:t>a separate calculation for</a:t>
+            </a:r>
+          </a:p>
+          <a:p>
+            <a:r>
+              <a:rPr lang="en-US" sz="1200" dirty="0" smtClean="0">
+                <a:solidFill>
+                  <a:srgbClr val="FF0000"/>
+                </a:solidFill>
+              </a:rPr>
+              <a:t>their final output.</a:t>
+            </a:r>
+            <a:endParaRPr lang="en-US" sz="1200" dirty="0" smtClean="0">
+              <a:solidFill>
+                <a:srgbClr val="FF0000"/>
+              </a:solidFill>
+            </a:endParaRPr>
+          </a:p>
+        </p:txBody>
+      </p:sp>
+      <p:cxnSp>
+        <p:nvCxnSpPr>
+          <p:cNvPr id="39" name="Straight Arrow Connector 38"/>
+          <p:cNvCxnSpPr/>
+          <p:nvPr/>
+        </p:nvCxnSpPr>
+        <p:spPr>
+          <a:xfrm flipV="1">
+            <a:off x="8353666" y="4462035"/>
+            <a:ext cx="0" cy="1169788"/>
+          </a:xfrm>
+          <a:prstGeom prst="straightConnector1">
+            <a:avLst/>
+          </a:prstGeom>
+          <a:ln>
+            <a:solidFill>
+              <a:srgbClr val="FF0000"/>
+            </a:solidFill>
+            <a:tailEnd type="arrow"/>
+          </a:ln>
+        </p:spPr>
+        <p:style>
+          <a:lnRef idx="1">
+            <a:schemeClr val="accent1"/>
+          </a:lnRef>
+          <a:fillRef idx="0">
+            <a:schemeClr val="accent1"/>
+          </a:fillRef>
+          <a:effectRef idx="0">
+            <a:schemeClr val="accent1"/>
+          </a:effectRef>
+          <a:fontRef idx="minor">
+            <a:schemeClr val="tx1"/>
+          </a:fontRef>
+        </p:style>
+      </p:cxnSp>
     </p:spTree>
     <p:extLst>
       <p:ext uri="{BB962C8B-B14F-4D97-AF65-F5344CB8AC3E}">
@@ -23139,15 +23591,7 @@
                   <a:srgbClr val="FF0000"/>
                 </a:solidFill>
               </a:rPr>
-              <a:t>adjust </a:t>
-            </a:r>
-            <a:r>
-              <a:rPr lang="en-US" sz="1200" dirty="0" smtClean="0">
-                <a:solidFill>
-                  <a:srgbClr val="FF0000"/>
-                </a:solidFill>
-              </a:rPr>
-              <a:t>(learn) the weights</a:t>
+              <a:t>adjust (learn) the weights</a:t>
             </a:r>
           </a:p>
           <a:p>
@@ -23364,11 +23808,6 @@
               </a:rPr>
               <a:t>(prediction).</a:t>
             </a:r>
-            <a:endParaRPr lang="en-US" sz="1200" dirty="0" smtClean="0">
-              <a:solidFill>
-                <a:srgbClr val="FF0000"/>
-              </a:solidFill>
-            </a:endParaRPr>
           </a:p>
         </p:txBody>
       </p:sp>
@@ -24245,8 +24684,8 @@
           </a:fontRef>
         </p:style>
       </p:cxnSp>
-      <mc:AlternateContent xmlns:mc="http://schemas.openxmlformats.org/markup-compatibility/2006">
-        <mc:Choice xmlns:a14="http://schemas.microsoft.com/office/drawing/2010/main" Requires="a14">
+      <mc:AlternateContent xmlns:mc="http://schemas.openxmlformats.org/markup-compatibility/2006" xmlns:a14="http://schemas.microsoft.com/office/drawing/2010/main">
+        <mc:Choice Requires="a14">
           <p:sp>
             <p:nvSpPr>
               <p:cNvPr id="36" name="TextBox 35"/>
@@ -24585,7 +25024,7 @@
             </p:txBody>
           </p:sp>
         </mc:Choice>
-        <mc:Fallback>
+        <mc:Fallback xmlns="">
           <p:sp>
             <p:nvSpPr>
               <p:cNvPr id="36" name="TextBox 35"/>
@@ -25076,11 +25515,6 @@
               </a:rPr>
               <a:t>Alternate representation.</a:t>
             </a:r>
-            <a:endParaRPr lang="en-US" sz="1200" dirty="0" smtClean="0">
-              <a:solidFill>
-                <a:srgbClr val="FF0000"/>
-              </a:solidFill>
-            </a:endParaRPr>
           </a:p>
         </p:txBody>
       </p:sp>
@@ -25495,17 +25929,7 @@
                   </a:schemeClr>
                 </a:solidFill>
               </a:rPr>
-              <a:t>   r</a:t>
-            </a:r>
-            <a:r>
-              <a:rPr lang="en-US" sz="2400" b="1" dirty="0" smtClean="0">
-                <a:solidFill>
-                  <a:schemeClr val="accent5">
-                    <a:lumMod val="75000"/>
-                  </a:schemeClr>
-                </a:solidFill>
-              </a:rPr>
-              <a:t>ectified.</a:t>
+              <a:t>   rectified.</a:t>
             </a:r>
             <a:br>
               <a:rPr lang="en-US" sz="2400" b="1" dirty="0" smtClean="0">

</xml_diff>